<commit_message>
FEAT: add merge logic
</commit_message>
<xml_diff>
--- a/Development_log/Assets/photos.pptx
+++ b/Development_log/Assets/photos.pptx
@@ -7,6 +7,8 @@
   <p:sldIdLst>
     <p:sldId id="256" r:id="rId2"/>
     <p:sldId id="257" r:id="rId3"/>
+    <p:sldId id="258" r:id="rId4"/>
+    <p:sldId id="259" r:id="rId5"/>
   </p:sldIdLst>
   <p:sldSz cx="12192000" cy="6858000"/>
   <p:notesSz cx="6858000" cy="9144000"/>
@@ -105,6 +107,11 @@
       </a:defRPr>
     </a:lvl9pPr>
   </p:defaultTextStyle>
+  <p:extLst>
+    <p:ext uri="{EFAFB233-063F-42B5-8137-9DF3F51BA10A}">
+      <p15:sldGuideLst xmlns:p15="http://schemas.microsoft.com/office/powerpoint/2012/main"/>
+    </p:ext>
+  </p:extLst>
 </p:presentation>
 </file>
 
@@ -255,7 +262,7 @@
           <a:p>
             <a:fld id="{2A07B033-BFCA-4D71-8E15-696F809DE473}" type="datetimeFigureOut">
               <a:rPr lang="ko-KR" altLang="en-US" smtClean="0"/>
-              <a:t>2022-04-12</a:t>
+              <a:t>2022-05-10</a:t>
             </a:fld>
             <a:endParaRPr lang="ko-KR" altLang="en-US"/>
           </a:p>
@@ -453,7 +460,7 @@
           <a:p>
             <a:fld id="{2A07B033-BFCA-4D71-8E15-696F809DE473}" type="datetimeFigureOut">
               <a:rPr lang="ko-KR" altLang="en-US" smtClean="0"/>
-              <a:t>2022-04-12</a:t>
+              <a:t>2022-05-10</a:t>
             </a:fld>
             <a:endParaRPr lang="ko-KR" altLang="en-US"/>
           </a:p>
@@ -661,7 +668,7 @@
           <a:p>
             <a:fld id="{2A07B033-BFCA-4D71-8E15-696F809DE473}" type="datetimeFigureOut">
               <a:rPr lang="ko-KR" altLang="en-US" smtClean="0"/>
-              <a:t>2022-04-12</a:t>
+              <a:t>2022-05-10</a:t>
             </a:fld>
             <a:endParaRPr lang="ko-KR" altLang="en-US"/>
           </a:p>
@@ -859,7 +866,7 @@
           <a:p>
             <a:fld id="{2A07B033-BFCA-4D71-8E15-696F809DE473}" type="datetimeFigureOut">
               <a:rPr lang="ko-KR" altLang="en-US" smtClean="0"/>
-              <a:t>2022-04-12</a:t>
+              <a:t>2022-05-10</a:t>
             </a:fld>
             <a:endParaRPr lang="ko-KR" altLang="en-US"/>
           </a:p>
@@ -1134,7 +1141,7 @@
           <a:p>
             <a:fld id="{2A07B033-BFCA-4D71-8E15-696F809DE473}" type="datetimeFigureOut">
               <a:rPr lang="ko-KR" altLang="en-US" smtClean="0"/>
-              <a:t>2022-04-12</a:t>
+              <a:t>2022-05-10</a:t>
             </a:fld>
             <a:endParaRPr lang="ko-KR" altLang="en-US"/>
           </a:p>
@@ -1399,7 +1406,7 @@
           <a:p>
             <a:fld id="{2A07B033-BFCA-4D71-8E15-696F809DE473}" type="datetimeFigureOut">
               <a:rPr lang="ko-KR" altLang="en-US" smtClean="0"/>
-              <a:t>2022-04-12</a:t>
+              <a:t>2022-05-10</a:t>
             </a:fld>
             <a:endParaRPr lang="ko-KR" altLang="en-US"/>
           </a:p>
@@ -1811,7 +1818,7 @@
           <a:p>
             <a:fld id="{2A07B033-BFCA-4D71-8E15-696F809DE473}" type="datetimeFigureOut">
               <a:rPr lang="ko-KR" altLang="en-US" smtClean="0"/>
-              <a:t>2022-04-12</a:t>
+              <a:t>2022-05-10</a:t>
             </a:fld>
             <a:endParaRPr lang="ko-KR" altLang="en-US"/>
           </a:p>
@@ -1952,7 +1959,7 @@
           <a:p>
             <a:fld id="{2A07B033-BFCA-4D71-8E15-696F809DE473}" type="datetimeFigureOut">
               <a:rPr lang="ko-KR" altLang="en-US" smtClean="0"/>
-              <a:t>2022-04-12</a:t>
+              <a:t>2022-05-10</a:t>
             </a:fld>
             <a:endParaRPr lang="ko-KR" altLang="en-US"/>
           </a:p>
@@ -2065,7 +2072,7 @@
           <a:p>
             <a:fld id="{2A07B033-BFCA-4D71-8E15-696F809DE473}" type="datetimeFigureOut">
               <a:rPr lang="ko-KR" altLang="en-US" smtClean="0"/>
-              <a:t>2022-04-12</a:t>
+              <a:t>2022-05-10</a:t>
             </a:fld>
             <a:endParaRPr lang="ko-KR" altLang="en-US"/>
           </a:p>
@@ -2376,7 +2383,7 @@
           <a:p>
             <a:fld id="{2A07B033-BFCA-4D71-8E15-696F809DE473}" type="datetimeFigureOut">
               <a:rPr lang="ko-KR" altLang="en-US" smtClean="0"/>
-              <a:t>2022-04-12</a:t>
+              <a:t>2022-05-10</a:t>
             </a:fld>
             <a:endParaRPr lang="ko-KR" altLang="en-US"/>
           </a:p>
@@ -2664,7 +2671,7 @@
           <a:p>
             <a:fld id="{2A07B033-BFCA-4D71-8E15-696F809DE473}" type="datetimeFigureOut">
               <a:rPr lang="ko-KR" altLang="en-US" smtClean="0"/>
-              <a:t>2022-04-12</a:t>
+              <a:t>2022-05-10</a:t>
             </a:fld>
             <a:endParaRPr lang="ko-KR" altLang="en-US"/>
           </a:p>
@@ -2905,7 +2912,7 @@
           <a:p>
             <a:fld id="{2A07B033-BFCA-4D71-8E15-696F809DE473}" type="datetimeFigureOut">
               <a:rPr lang="ko-KR" altLang="en-US" smtClean="0"/>
-              <a:t>2022-04-12</a:t>
+              <a:t>2022-05-10</a:t>
             </a:fld>
             <a:endParaRPr lang="ko-KR" altLang="en-US"/>
           </a:p>
@@ -3931,6 +3938,1244 @@
 </p:sld>
 </file>
 
+<file path=ppt/slides/slide3.xml><?xml version="1.0" encoding="utf-8"?>
+<p:sld xmlns:a="http://schemas.openxmlformats.org/drawingml/2006/main" xmlns:r="http://schemas.openxmlformats.org/officeDocument/2006/relationships" xmlns:p="http://schemas.openxmlformats.org/presentationml/2006/main">
+  <p:cSld>
+    <p:spTree>
+      <p:nvGrpSpPr>
+        <p:cNvPr id="1" name=""/>
+        <p:cNvGrpSpPr/>
+        <p:nvPr/>
+      </p:nvGrpSpPr>
+      <p:grpSpPr>
+        <a:xfrm>
+          <a:off x="0" y="0"/>
+          <a:ext cx="0" cy="0"/>
+          <a:chOff x="0" y="0"/>
+          <a:chExt cx="0" cy="0"/>
+        </a:xfrm>
+      </p:grpSpPr>
+      <p:grpSp>
+        <p:nvGrpSpPr>
+          <p:cNvPr id="20" name="그룹 19">
+            <a:extLst>
+              <a:ext uri="{FF2B5EF4-FFF2-40B4-BE49-F238E27FC236}">
+                <a16:creationId xmlns:a16="http://schemas.microsoft.com/office/drawing/2014/main" id="{7B2D44A0-26DD-81A4-AE3E-D8352D03C9E5}"/>
+              </a:ext>
+            </a:extLst>
+          </p:cNvPr>
+          <p:cNvGrpSpPr/>
+          <p:nvPr/>
+        </p:nvGrpSpPr>
+        <p:grpSpPr>
+          <a:xfrm>
+            <a:off x="2209800" y="1671316"/>
+            <a:ext cx="7772400" cy="3515368"/>
+            <a:chOff x="2209800" y="1214470"/>
+            <a:chExt cx="7772400" cy="3515368"/>
+          </a:xfrm>
+        </p:grpSpPr>
+        <p:pic>
+          <p:nvPicPr>
+            <p:cNvPr id="5" name="그림 4">
+              <a:extLst>
+                <a:ext uri="{FF2B5EF4-FFF2-40B4-BE49-F238E27FC236}">
+                  <a16:creationId xmlns:a16="http://schemas.microsoft.com/office/drawing/2014/main" id="{0F314E95-F8A7-2C55-01A4-6BD9407B6E87}"/>
+                </a:ext>
+              </a:extLst>
+            </p:cNvPr>
+            <p:cNvPicPr>
+              <a:picLocks noChangeAspect="1"/>
+            </p:cNvPicPr>
+            <p:nvPr/>
+          </p:nvPicPr>
+          <p:blipFill>
+            <a:blip r:embed="rId2">
+              <a:extLst>
+                <a:ext uri="{28A0092B-C50C-407E-A947-70E740481C1C}">
+                  <a14:useLocalDpi xmlns:a14="http://schemas.microsoft.com/office/drawing/2010/main" val="0"/>
+                </a:ext>
+              </a:extLst>
+            </a:blip>
+            <a:stretch>
+              <a:fillRect/>
+            </a:stretch>
+          </p:blipFill>
+          <p:spPr>
+            <a:xfrm>
+              <a:off x="2209800" y="1214470"/>
+              <a:ext cx="3886200" cy="2914650"/>
+            </a:xfrm>
+            <a:prstGeom prst="rect">
+              <a:avLst/>
+            </a:prstGeom>
+            <a:ln w="28575">
+              <a:solidFill>
+                <a:srgbClr val="FF0000"/>
+              </a:solidFill>
+            </a:ln>
+          </p:spPr>
+        </p:pic>
+        <p:pic>
+          <p:nvPicPr>
+            <p:cNvPr id="9" name="그림 8">
+              <a:extLst>
+                <a:ext uri="{FF2B5EF4-FFF2-40B4-BE49-F238E27FC236}">
+                  <a16:creationId xmlns:a16="http://schemas.microsoft.com/office/drawing/2014/main" id="{D82C9EE1-86F9-3973-D85A-0B00B81CF820}"/>
+                </a:ext>
+              </a:extLst>
+            </p:cNvPr>
+            <p:cNvPicPr>
+              <a:picLocks noChangeAspect="1"/>
+            </p:cNvPicPr>
+            <p:nvPr/>
+          </p:nvPicPr>
+          <p:blipFill>
+            <a:blip r:embed="rId3">
+              <a:extLst>
+                <a:ext uri="{28A0092B-C50C-407E-A947-70E740481C1C}">
+                  <a14:useLocalDpi xmlns:a14="http://schemas.microsoft.com/office/drawing/2010/main" val="0"/>
+                </a:ext>
+              </a:extLst>
+            </a:blip>
+            <a:stretch>
+              <a:fillRect/>
+            </a:stretch>
+          </p:blipFill>
+          <p:spPr>
+            <a:xfrm>
+              <a:off x="6096000" y="1214470"/>
+              <a:ext cx="3886200" cy="2914650"/>
+            </a:xfrm>
+            <a:prstGeom prst="rect">
+              <a:avLst/>
+            </a:prstGeom>
+            <a:ln w="28575">
+              <a:solidFill>
+                <a:srgbClr val="FF0000"/>
+              </a:solidFill>
+            </a:ln>
+          </p:spPr>
+        </p:pic>
+        <p:pic>
+          <p:nvPicPr>
+            <p:cNvPr id="7" name="그림 6" descr="무척추동물, 하얀색이(가) 표시된 사진&#10;&#10;자동 생성된 설명">
+              <a:extLst>
+                <a:ext uri="{FF2B5EF4-FFF2-40B4-BE49-F238E27FC236}">
+                  <a16:creationId xmlns:a16="http://schemas.microsoft.com/office/drawing/2014/main" id="{A05A7000-2A85-07C6-6B54-FD7F1C6391A7}"/>
+                </a:ext>
+              </a:extLst>
+            </p:cNvPr>
+            <p:cNvPicPr>
+              <a:picLocks noChangeAspect="1"/>
+            </p:cNvPicPr>
+            <p:nvPr/>
+          </p:nvPicPr>
+          <p:blipFill rotWithShape="1">
+            <a:blip r:embed="rId4">
+              <a:alphaModFix amt="70000"/>
+              <a:extLst>
+                <a:ext uri="{28A0092B-C50C-407E-A947-70E740481C1C}">
+                  <a14:useLocalDpi xmlns:a14="http://schemas.microsoft.com/office/drawing/2010/main" val="0"/>
+                </a:ext>
+              </a:extLst>
+            </a:blip>
+            <a:srcRect l="29993" r="29191"/>
+            <a:stretch/>
+          </p:blipFill>
+          <p:spPr>
+            <a:xfrm>
+              <a:off x="5302899" y="1214470"/>
+              <a:ext cx="1586204" cy="2914650"/>
+            </a:xfrm>
+            <a:prstGeom prst="rect">
+              <a:avLst/>
+            </a:prstGeom>
+            <a:ln w="28575">
+              <a:solidFill>
+                <a:srgbClr val="FFFF00"/>
+              </a:solidFill>
+            </a:ln>
+          </p:spPr>
+        </p:pic>
+        <p:sp>
+          <p:nvSpPr>
+            <p:cNvPr id="19" name="TextBox 18">
+              <a:extLst>
+                <a:ext uri="{FF2B5EF4-FFF2-40B4-BE49-F238E27FC236}">
+                  <a16:creationId xmlns:a16="http://schemas.microsoft.com/office/drawing/2014/main" id="{7BED571E-DB48-B62B-C06D-4C1001B9396B}"/>
+                </a:ext>
+              </a:extLst>
+            </p:cNvPr>
+            <p:cNvSpPr txBox="1"/>
+            <p:nvPr/>
+          </p:nvSpPr>
+          <p:spPr>
+            <a:xfrm>
+              <a:off x="2950139" y="4360506"/>
+              <a:ext cx="6291722" cy="369332"/>
+            </a:xfrm>
+            <a:prstGeom prst="rect">
+              <a:avLst/>
+            </a:prstGeom>
+            <a:noFill/>
+          </p:spPr>
+          <p:txBody>
+            <a:bodyPr wrap="none" rtlCol="0">
+              <a:spAutoFit/>
+            </a:bodyPr>
+            <a:lstStyle/>
+            <a:p>
+              <a:r>
+                <a:rPr lang="ko-KR" altLang="en-US" dirty="0">
+                  <a:solidFill>
+                    <a:schemeClr val="accent1"/>
+                  </a:solidFill>
+                </a:rPr>
+                <a:t>중앙의 </a:t>
+              </a:r>
+              <a:r>
+                <a:rPr lang="en-US" altLang="ko-KR" dirty="0">
+                  <a:solidFill>
+                    <a:schemeClr val="accent1"/>
+                  </a:solidFill>
+                </a:rPr>
+                <a:t>Patch</a:t>
+              </a:r>
+              <a:r>
+                <a:rPr lang="ko-KR" altLang="en-US" dirty="0">
+                  <a:solidFill>
+                    <a:schemeClr val="accent1"/>
+                  </a:solidFill>
+                </a:rPr>
+                <a:t>는</a:t>
+              </a:r>
+              <a:r>
+                <a:rPr lang="en-US" altLang="ko-KR" dirty="0">
+                  <a:solidFill>
+                    <a:schemeClr val="accent1"/>
+                  </a:solidFill>
+                </a:rPr>
+                <a:t> </a:t>
+              </a:r>
+              <a:r>
+                <a:rPr lang="ko-KR" altLang="en-US" dirty="0">
+                  <a:solidFill>
+                    <a:schemeClr val="accent1"/>
+                  </a:solidFill>
+                </a:rPr>
+                <a:t>가운데 </a:t>
+              </a:r>
+              <a:r>
+                <a:rPr lang="en-US" altLang="ko-KR" dirty="0">
+                  <a:solidFill>
+                    <a:schemeClr val="accent1"/>
+                  </a:solidFill>
+                </a:rPr>
+                <a:t>±40 </a:t>
+              </a:r>
+              <a:r>
+                <a:rPr lang="ko-KR" altLang="en-US" dirty="0">
+                  <a:solidFill>
+                    <a:schemeClr val="accent1"/>
+                  </a:solidFill>
+                </a:rPr>
+                <a:t>사이즈에 있는 </a:t>
+              </a:r>
+              <a:r>
+                <a:rPr lang="en-US" altLang="ko-KR" dirty="0">
+                  <a:solidFill>
+                    <a:schemeClr val="accent1"/>
+                  </a:solidFill>
+                </a:rPr>
+                <a:t>cell</a:t>
+              </a:r>
+              <a:r>
+                <a:rPr lang="ko-KR" altLang="en-US" dirty="0">
+                  <a:solidFill>
+                    <a:schemeClr val="accent1"/>
+                  </a:solidFill>
+                </a:rPr>
+                <a:t>만 </a:t>
+              </a:r>
+              <a:r>
+                <a:rPr lang="en-US" altLang="ko-KR" dirty="0">
+                  <a:solidFill>
+                    <a:schemeClr val="accent1"/>
+                  </a:solidFill>
+                </a:rPr>
+                <a:t>detection</a:t>
+              </a:r>
+              <a:endParaRPr lang="ko-KR" altLang="en-US" dirty="0">
+                <a:solidFill>
+                  <a:schemeClr val="accent1"/>
+                </a:solidFill>
+              </a:endParaRPr>
+            </a:p>
+          </p:txBody>
+        </p:sp>
+      </p:grpSp>
+    </p:spTree>
+    <p:extLst>
+      <p:ext uri="{BB962C8B-B14F-4D97-AF65-F5344CB8AC3E}">
+        <p14:creationId xmlns:p14="http://schemas.microsoft.com/office/powerpoint/2010/main" val="2599513499"/>
+      </p:ext>
+    </p:extLst>
+  </p:cSld>
+  <p:clrMapOvr>
+    <a:masterClrMapping/>
+  </p:clrMapOvr>
+</p:sld>
+</file>
+
+<file path=ppt/slides/slide4.xml><?xml version="1.0" encoding="utf-8"?>
+<p:sld xmlns:a="http://schemas.openxmlformats.org/drawingml/2006/main" xmlns:r="http://schemas.openxmlformats.org/officeDocument/2006/relationships" xmlns:p="http://schemas.openxmlformats.org/presentationml/2006/main">
+  <p:cSld>
+    <p:spTree>
+      <p:nvGrpSpPr>
+        <p:cNvPr id="1" name=""/>
+        <p:cNvGrpSpPr/>
+        <p:nvPr/>
+      </p:nvGrpSpPr>
+      <p:grpSpPr>
+        <a:xfrm>
+          <a:off x="0" y="0"/>
+          <a:ext cx="0" cy="0"/>
+          <a:chOff x="0" y="0"/>
+          <a:chExt cx="0" cy="0"/>
+        </a:xfrm>
+      </p:grpSpPr>
+      <p:grpSp>
+        <p:nvGrpSpPr>
+          <p:cNvPr id="32" name="그룹 31">
+            <a:extLst>
+              <a:ext uri="{FF2B5EF4-FFF2-40B4-BE49-F238E27FC236}">
+                <a16:creationId xmlns:a16="http://schemas.microsoft.com/office/drawing/2014/main" id="{520999FA-D461-35D7-ECD3-CA78CA39D601}"/>
+              </a:ext>
+            </a:extLst>
+          </p:cNvPr>
+          <p:cNvGrpSpPr/>
+          <p:nvPr/>
+        </p:nvGrpSpPr>
+        <p:grpSpPr>
+          <a:xfrm>
+            <a:off x="2194055" y="245121"/>
+            <a:ext cx="7803889" cy="6367757"/>
+            <a:chOff x="2194055" y="245121"/>
+            <a:chExt cx="7803889" cy="6367757"/>
+          </a:xfrm>
+        </p:grpSpPr>
+        <p:grpSp>
+          <p:nvGrpSpPr>
+            <p:cNvPr id="22" name="그룹 21">
+              <a:extLst>
+                <a:ext uri="{FF2B5EF4-FFF2-40B4-BE49-F238E27FC236}">
+                  <a16:creationId xmlns:a16="http://schemas.microsoft.com/office/drawing/2014/main" id="{11B9FF33-DE95-7663-B3FF-B7606A6BE057}"/>
+                </a:ext>
+              </a:extLst>
+            </p:cNvPr>
+            <p:cNvGrpSpPr/>
+            <p:nvPr/>
+          </p:nvGrpSpPr>
+          <p:grpSpPr>
+            <a:xfrm>
+              <a:off x="2194055" y="245121"/>
+              <a:ext cx="7803889" cy="6367757"/>
+              <a:chOff x="2208633" y="203322"/>
+              <a:chExt cx="7803889" cy="6367757"/>
+            </a:xfrm>
+          </p:grpSpPr>
+          <p:pic>
+            <p:nvPicPr>
+              <p:cNvPr id="13" name="그림 12">
+                <a:extLst>
+                  <a:ext uri="{FF2B5EF4-FFF2-40B4-BE49-F238E27FC236}">
+                    <a16:creationId xmlns:a16="http://schemas.microsoft.com/office/drawing/2014/main" id="{548964D4-FC43-3ADE-A65A-C1DB32A1EDAC}"/>
+                  </a:ext>
+                </a:extLst>
+              </p:cNvPr>
+              <p:cNvPicPr>
+                <a:picLocks noChangeAspect="1"/>
+              </p:cNvPicPr>
+              <p:nvPr/>
+            </p:nvPicPr>
+            <p:blipFill>
+              <a:blip r:embed="rId2">
+                <a:extLst>
+                  <a:ext uri="{28A0092B-C50C-407E-A947-70E740481C1C}">
+                    <a14:useLocalDpi xmlns:a14="http://schemas.microsoft.com/office/drawing/2010/main" val="0"/>
+                  </a:ext>
+                </a:extLst>
+              </a:blip>
+              <a:stretch>
+                <a:fillRect/>
+              </a:stretch>
+            </p:blipFill>
+            <p:spPr>
+              <a:xfrm>
+                <a:off x="6096000" y="3117979"/>
+                <a:ext cx="3886200" cy="2914650"/>
+              </a:xfrm>
+              <a:prstGeom prst="rect">
+                <a:avLst/>
+              </a:prstGeom>
+              <a:ln w="28575">
+                <a:solidFill>
+                  <a:srgbClr val="FF0000"/>
+                </a:solidFill>
+              </a:ln>
+            </p:spPr>
+          </p:pic>
+          <p:pic>
+            <p:nvPicPr>
+              <p:cNvPr id="5" name="그림 4">
+                <a:extLst>
+                  <a:ext uri="{FF2B5EF4-FFF2-40B4-BE49-F238E27FC236}">
+                    <a16:creationId xmlns:a16="http://schemas.microsoft.com/office/drawing/2014/main" id="{0F314E95-F8A7-2C55-01A4-6BD9407B6E87}"/>
+                  </a:ext>
+                </a:extLst>
+              </p:cNvPr>
+              <p:cNvPicPr>
+                <a:picLocks noChangeAspect="1"/>
+              </p:cNvPicPr>
+              <p:nvPr/>
+            </p:nvPicPr>
+            <p:blipFill>
+              <a:blip r:embed="rId3">
+                <a:extLst>
+                  <a:ext uri="{28A0092B-C50C-407E-A947-70E740481C1C}">
+                    <a14:useLocalDpi xmlns:a14="http://schemas.microsoft.com/office/drawing/2010/main" val="0"/>
+                  </a:ext>
+                </a:extLst>
+              </a:blip>
+              <a:stretch>
+                <a:fillRect/>
+              </a:stretch>
+            </p:blipFill>
+            <p:spPr>
+              <a:xfrm>
+                <a:off x="2208633" y="203322"/>
+                <a:ext cx="3886200" cy="2914650"/>
+              </a:xfrm>
+              <a:prstGeom prst="rect">
+                <a:avLst/>
+              </a:prstGeom>
+              <a:ln w="28575">
+                <a:solidFill>
+                  <a:srgbClr val="FF0000"/>
+                </a:solidFill>
+              </a:ln>
+            </p:spPr>
+          </p:pic>
+          <p:pic>
+            <p:nvPicPr>
+              <p:cNvPr id="9" name="그림 8">
+                <a:extLst>
+                  <a:ext uri="{FF2B5EF4-FFF2-40B4-BE49-F238E27FC236}">
+                    <a16:creationId xmlns:a16="http://schemas.microsoft.com/office/drawing/2014/main" id="{D82C9EE1-86F9-3973-D85A-0B00B81CF820}"/>
+                  </a:ext>
+                </a:extLst>
+              </p:cNvPr>
+              <p:cNvPicPr>
+                <a:picLocks noChangeAspect="1"/>
+              </p:cNvPicPr>
+              <p:nvPr/>
+            </p:nvPicPr>
+            <p:blipFill>
+              <a:blip r:embed="rId4">
+                <a:extLst>
+                  <a:ext uri="{28A0092B-C50C-407E-A947-70E740481C1C}">
+                    <a14:useLocalDpi xmlns:a14="http://schemas.microsoft.com/office/drawing/2010/main" val="0"/>
+                  </a:ext>
+                </a:extLst>
+              </a:blip>
+              <a:stretch>
+                <a:fillRect/>
+              </a:stretch>
+            </p:blipFill>
+            <p:spPr>
+              <a:xfrm>
+                <a:off x="6096000" y="203330"/>
+                <a:ext cx="3886200" cy="2914650"/>
+              </a:xfrm>
+              <a:prstGeom prst="rect">
+                <a:avLst/>
+              </a:prstGeom>
+              <a:ln w="28575">
+                <a:solidFill>
+                  <a:srgbClr val="FF0000"/>
+                </a:solidFill>
+              </a:ln>
+            </p:spPr>
+          </p:pic>
+          <p:pic>
+            <p:nvPicPr>
+              <p:cNvPr id="6" name="그림 5">
+                <a:extLst>
+                  <a:ext uri="{FF2B5EF4-FFF2-40B4-BE49-F238E27FC236}">
+                    <a16:creationId xmlns:a16="http://schemas.microsoft.com/office/drawing/2014/main" id="{9A2D8C12-6626-6378-AF6D-BEBFB47C5F94}"/>
+                  </a:ext>
+                </a:extLst>
+              </p:cNvPr>
+              <p:cNvPicPr>
+                <a:picLocks noChangeAspect="1"/>
+              </p:cNvPicPr>
+              <p:nvPr/>
+            </p:nvPicPr>
+            <p:blipFill>
+              <a:blip r:embed="rId5">
+                <a:extLst>
+                  <a:ext uri="{28A0092B-C50C-407E-A947-70E740481C1C}">
+                    <a14:useLocalDpi xmlns:a14="http://schemas.microsoft.com/office/drawing/2010/main" val="0"/>
+                  </a:ext>
+                </a:extLst>
+              </a:blip>
+              <a:stretch>
+                <a:fillRect/>
+              </a:stretch>
+            </p:blipFill>
+            <p:spPr>
+              <a:xfrm>
+                <a:off x="2209022" y="3117979"/>
+                <a:ext cx="3886200" cy="2914650"/>
+              </a:xfrm>
+              <a:prstGeom prst="rect">
+                <a:avLst/>
+              </a:prstGeom>
+              <a:ln w="28575">
+                <a:solidFill>
+                  <a:srgbClr val="FF0000"/>
+                </a:solidFill>
+              </a:ln>
+            </p:spPr>
+          </p:pic>
+          <p:pic>
+            <p:nvPicPr>
+              <p:cNvPr id="7" name="그림 6" descr="무척추동물, 하얀색이(가) 표시된 사진&#10;&#10;자동 생성된 설명">
+                <a:extLst>
+                  <a:ext uri="{FF2B5EF4-FFF2-40B4-BE49-F238E27FC236}">
+                    <a16:creationId xmlns:a16="http://schemas.microsoft.com/office/drawing/2014/main" id="{A05A7000-2A85-07C6-6B54-FD7F1C6391A7}"/>
+                  </a:ext>
+                </a:extLst>
+              </p:cNvPr>
+              <p:cNvPicPr>
+                <a:picLocks noChangeAspect="1"/>
+              </p:cNvPicPr>
+              <p:nvPr/>
+            </p:nvPicPr>
+            <p:blipFill rotWithShape="1">
+              <a:blip r:embed="rId6">
+                <a:alphaModFix amt="70000"/>
+                <a:extLst>
+                  <a:ext uri="{28A0092B-C50C-407E-A947-70E740481C1C}">
+                    <a14:useLocalDpi xmlns:a14="http://schemas.microsoft.com/office/drawing/2010/main" val="0"/>
+                  </a:ext>
+                </a:extLst>
+              </a:blip>
+              <a:srcRect l="29993" r="29191"/>
+              <a:stretch/>
+            </p:blipFill>
+            <p:spPr>
+              <a:xfrm>
+                <a:off x="5302121" y="203330"/>
+                <a:ext cx="1586204" cy="2914650"/>
+              </a:xfrm>
+              <a:prstGeom prst="rect">
+                <a:avLst/>
+              </a:prstGeom>
+              <a:ln w="28575">
+                <a:solidFill>
+                  <a:srgbClr val="FFFF00"/>
+                </a:solidFill>
+              </a:ln>
+            </p:spPr>
+          </p:pic>
+          <p:pic>
+            <p:nvPicPr>
+              <p:cNvPr id="3" name="그림 2">
+                <a:extLst>
+                  <a:ext uri="{FF2B5EF4-FFF2-40B4-BE49-F238E27FC236}">
+                    <a16:creationId xmlns:a16="http://schemas.microsoft.com/office/drawing/2014/main" id="{54C82F61-BBB4-EE57-0C25-64542D097AB3}"/>
+                  </a:ext>
+                </a:extLst>
+              </p:cNvPr>
+              <p:cNvPicPr>
+                <a:picLocks noChangeAspect="1"/>
+              </p:cNvPicPr>
+              <p:nvPr/>
+            </p:nvPicPr>
+            <p:blipFill rotWithShape="1">
+              <a:blip r:embed="rId7">
+                <a:alphaModFix amt="70000"/>
+                <a:extLst>
+                  <a:ext uri="{28A0092B-C50C-407E-A947-70E740481C1C}">
+                    <a14:useLocalDpi xmlns:a14="http://schemas.microsoft.com/office/drawing/2010/main" val="0"/>
+                  </a:ext>
+                </a:extLst>
+              </a:blip>
+              <a:srcRect t="22824" b="22754"/>
+              <a:stretch/>
+            </p:blipFill>
+            <p:spPr>
+              <a:xfrm>
+                <a:off x="2208633" y="2324874"/>
+                <a:ext cx="3886200" cy="1586207"/>
+              </a:xfrm>
+              <a:prstGeom prst="rect">
+                <a:avLst/>
+              </a:prstGeom>
+              <a:ln w="28575">
+                <a:solidFill>
+                  <a:srgbClr val="FFFF00"/>
+                </a:solidFill>
+              </a:ln>
+            </p:spPr>
+          </p:pic>
+          <p:pic>
+            <p:nvPicPr>
+              <p:cNvPr id="11" name="그림 10">
+                <a:extLst>
+                  <a:ext uri="{FF2B5EF4-FFF2-40B4-BE49-F238E27FC236}">
+                    <a16:creationId xmlns:a16="http://schemas.microsoft.com/office/drawing/2014/main" id="{EFC87170-038B-6902-C0A2-75D665134D79}"/>
+                  </a:ext>
+                </a:extLst>
+              </p:cNvPr>
+              <p:cNvPicPr>
+                <a:picLocks noChangeAspect="1"/>
+              </p:cNvPicPr>
+              <p:nvPr/>
+            </p:nvPicPr>
+            <p:blipFill rotWithShape="1">
+              <a:blip r:embed="rId8">
+                <a:alphaModFix amt="70000"/>
+                <a:extLst>
+                  <a:ext uri="{28A0092B-C50C-407E-A947-70E740481C1C}">
+                    <a14:useLocalDpi xmlns:a14="http://schemas.microsoft.com/office/drawing/2010/main" val="0"/>
+                  </a:ext>
+                </a:extLst>
+              </a:blip>
+              <a:srcRect t="22775" b="22803"/>
+              <a:stretch/>
+            </p:blipFill>
+            <p:spPr>
+              <a:xfrm>
+                <a:off x="6126322" y="2324873"/>
+                <a:ext cx="3886200" cy="1586205"/>
+              </a:xfrm>
+              <a:prstGeom prst="rect">
+                <a:avLst/>
+              </a:prstGeom>
+              <a:ln w="28575">
+                <a:solidFill>
+                  <a:srgbClr val="FFFF00"/>
+                </a:solidFill>
+              </a:ln>
+            </p:spPr>
+          </p:pic>
+          <p:pic>
+            <p:nvPicPr>
+              <p:cNvPr id="20" name="그림 19">
+                <a:extLst>
+                  <a:ext uri="{FF2B5EF4-FFF2-40B4-BE49-F238E27FC236}">
+                    <a16:creationId xmlns:a16="http://schemas.microsoft.com/office/drawing/2014/main" id="{5028A9AA-BF61-8E4B-A5EC-53E437E60172}"/>
+                  </a:ext>
+                </a:extLst>
+              </p:cNvPr>
+              <p:cNvPicPr>
+                <a:picLocks noChangeAspect="1"/>
+              </p:cNvPicPr>
+              <p:nvPr/>
+            </p:nvPicPr>
+            <p:blipFill rotWithShape="1">
+              <a:blip r:embed="rId9">
+                <a:alphaModFix amt="70000"/>
+                <a:extLst>
+                  <a:ext uri="{28A0092B-C50C-407E-A947-70E740481C1C}">
+                    <a14:useLocalDpi xmlns:a14="http://schemas.microsoft.com/office/drawing/2010/main" val="0"/>
+                  </a:ext>
+                </a:extLst>
+              </a:blip>
+              <a:srcRect l="29872" r="29312"/>
+              <a:stretch/>
+            </p:blipFill>
+            <p:spPr>
+              <a:xfrm>
+                <a:off x="5302121" y="3117979"/>
+                <a:ext cx="1586204" cy="2914650"/>
+              </a:xfrm>
+              <a:prstGeom prst="rect">
+                <a:avLst/>
+              </a:prstGeom>
+              <a:ln w="28575">
+                <a:solidFill>
+                  <a:srgbClr val="FFFF00"/>
+                </a:solidFill>
+              </a:ln>
+            </p:spPr>
+          </p:pic>
+          <p:pic>
+            <p:nvPicPr>
+              <p:cNvPr id="17" name="그림 16" descr="무척추동물이(가) 표시된 사진&#10;&#10;자동 생성된 설명">
+                <a:extLst>
+                  <a:ext uri="{FF2B5EF4-FFF2-40B4-BE49-F238E27FC236}">
+                    <a16:creationId xmlns:a16="http://schemas.microsoft.com/office/drawing/2014/main" id="{F296919E-9433-069D-0C07-E07AA2C874D8}"/>
+                  </a:ext>
+                </a:extLst>
+              </p:cNvPr>
+              <p:cNvPicPr>
+                <a:picLocks noChangeAspect="1"/>
+              </p:cNvPicPr>
+              <p:nvPr/>
+            </p:nvPicPr>
+            <p:blipFill rotWithShape="1">
+              <a:blip r:embed="rId10">
+                <a:alphaModFix amt="70000"/>
+                <a:extLst>
+                  <a:ext uri="{28A0092B-C50C-407E-A947-70E740481C1C}">
+                    <a14:useLocalDpi xmlns:a14="http://schemas.microsoft.com/office/drawing/2010/main" val="0"/>
+                  </a:ext>
+                </a:extLst>
+              </a:blip>
+              <a:srcRect l="29572" t="22790" r="29612" b="22788"/>
+              <a:stretch/>
+            </p:blipFill>
+            <p:spPr>
+              <a:xfrm>
+                <a:off x="5302121" y="2324873"/>
+                <a:ext cx="1586204" cy="1586205"/>
+              </a:xfrm>
+              <a:prstGeom prst="rect">
+                <a:avLst/>
+              </a:prstGeom>
+              <a:ln w="28575">
+                <a:solidFill>
+                  <a:schemeClr val="accent6"/>
+                </a:solidFill>
+              </a:ln>
+            </p:spPr>
+          </p:pic>
+          <p:sp>
+            <p:nvSpPr>
+              <p:cNvPr id="21" name="TextBox 20">
+                <a:extLst>
+                  <a:ext uri="{FF2B5EF4-FFF2-40B4-BE49-F238E27FC236}">
+                    <a16:creationId xmlns:a16="http://schemas.microsoft.com/office/drawing/2014/main" id="{2ED50C52-5C73-6F6B-D0EB-E7E589F848EF}"/>
+                  </a:ext>
+                </a:extLst>
+              </p:cNvPr>
+              <p:cNvSpPr txBox="1"/>
+              <p:nvPr/>
+            </p:nvSpPr>
+            <p:spPr>
+              <a:xfrm>
+                <a:off x="4913490" y="6201747"/>
+                <a:ext cx="2425664" cy="369332"/>
+              </a:xfrm>
+              <a:prstGeom prst="rect">
+                <a:avLst/>
+              </a:prstGeom>
+              <a:noFill/>
+            </p:spPr>
+            <p:txBody>
+              <a:bodyPr wrap="none" rtlCol="0">
+                <a:spAutoFit/>
+              </a:bodyPr>
+              <a:lstStyle/>
+              <a:p>
+                <a:r>
+                  <a:rPr lang="ko-KR" altLang="en-US" dirty="0">
+                    <a:solidFill>
+                      <a:schemeClr val="accent1"/>
+                    </a:solidFill>
+                  </a:rPr>
+                  <a:t>상하좌우로 붙일 경우</a:t>
+                </a:r>
+              </a:p>
+            </p:txBody>
+          </p:sp>
+        </p:grpSp>
+        <p:sp>
+          <p:nvSpPr>
+            <p:cNvPr id="23" name="직사각형 22">
+              <a:extLst>
+                <a:ext uri="{FF2B5EF4-FFF2-40B4-BE49-F238E27FC236}">
+                  <a16:creationId xmlns:a16="http://schemas.microsoft.com/office/drawing/2014/main" id="{4EC194A4-FFD4-98BC-FF99-61AB69672F79}"/>
+                </a:ext>
+              </a:extLst>
+            </p:cNvPr>
+            <p:cNvSpPr/>
+            <p:nvPr/>
+          </p:nvSpPr>
+          <p:spPr>
+            <a:xfrm>
+              <a:off x="2345094" y="3377682"/>
+              <a:ext cx="466530" cy="447869"/>
+            </a:xfrm>
+            <a:prstGeom prst="rect">
+              <a:avLst/>
+            </a:prstGeom>
+            <a:noFill/>
+            <a:ln w="28575">
+              <a:solidFill>
+                <a:srgbClr val="FFFF00"/>
+              </a:solidFill>
+            </a:ln>
+          </p:spPr>
+          <p:style>
+            <a:lnRef idx="2">
+              <a:schemeClr val="accent1">
+                <a:shade val="50000"/>
+              </a:schemeClr>
+            </a:lnRef>
+            <a:fillRef idx="1">
+              <a:schemeClr val="accent1"/>
+            </a:fillRef>
+            <a:effectRef idx="0">
+              <a:schemeClr val="accent1"/>
+            </a:effectRef>
+            <a:fontRef idx="minor">
+              <a:schemeClr val="lt1"/>
+            </a:fontRef>
+          </p:style>
+          <p:txBody>
+            <a:bodyPr rtlCol="0" anchor="ctr"/>
+            <a:lstStyle/>
+            <a:p>
+              <a:pPr algn="ctr"/>
+              <a:endParaRPr lang="ko-KR" altLang="en-US"/>
+            </a:p>
+          </p:txBody>
+        </p:sp>
+        <p:sp>
+          <p:nvSpPr>
+            <p:cNvPr id="24" name="직사각형 23">
+              <a:extLst>
+                <a:ext uri="{FF2B5EF4-FFF2-40B4-BE49-F238E27FC236}">
+                  <a16:creationId xmlns:a16="http://schemas.microsoft.com/office/drawing/2014/main" id="{EDF0CC3C-56FF-19F8-9797-AD915B89CB7C}"/>
+                </a:ext>
+              </a:extLst>
+            </p:cNvPr>
+            <p:cNvSpPr/>
+            <p:nvPr/>
+          </p:nvSpPr>
+          <p:spPr>
+            <a:xfrm>
+              <a:off x="5054278" y="3299342"/>
+              <a:ext cx="466530" cy="447869"/>
+            </a:xfrm>
+            <a:prstGeom prst="rect">
+              <a:avLst/>
+            </a:prstGeom>
+            <a:noFill/>
+            <a:ln w="28575">
+              <a:solidFill>
+                <a:schemeClr val="accent6"/>
+              </a:solidFill>
+            </a:ln>
+          </p:spPr>
+          <p:style>
+            <a:lnRef idx="2">
+              <a:schemeClr val="accent1">
+                <a:shade val="50000"/>
+              </a:schemeClr>
+            </a:lnRef>
+            <a:fillRef idx="1">
+              <a:schemeClr val="accent1"/>
+            </a:fillRef>
+            <a:effectRef idx="0">
+              <a:schemeClr val="accent1"/>
+            </a:effectRef>
+            <a:fontRef idx="minor">
+              <a:schemeClr val="lt1"/>
+            </a:fontRef>
+          </p:style>
+          <p:txBody>
+            <a:bodyPr rtlCol="0" anchor="ctr"/>
+            <a:lstStyle/>
+            <a:p>
+              <a:pPr algn="ctr"/>
+              <a:endParaRPr lang="ko-KR" altLang="en-US"/>
+            </a:p>
+          </p:txBody>
+        </p:sp>
+        <p:sp>
+          <p:nvSpPr>
+            <p:cNvPr id="25" name="직사각형 24">
+              <a:extLst>
+                <a:ext uri="{FF2B5EF4-FFF2-40B4-BE49-F238E27FC236}">
+                  <a16:creationId xmlns:a16="http://schemas.microsoft.com/office/drawing/2014/main" id="{A567F864-699A-B7A7-99D3-A550002FB2F2}"/>
+                </a:ext>
+              </a:extLst>
+            </p:cNvPr>
+            <p:cNvSpPr/>
+            <p:nvPr/>
+          </p:nvSpPr>
+          <p:spPr>
+            <a:xfrm>
+              <a:off x="3792506" y="3421037"/>
+              <a:ext cx="466530" cy="447869"/>
+            </a:xfrm>
+            <a:prstGeom prst="rect">
+              <a:avLst/>
+            </a:prstGeom>
+            <a:noFill/>
+            <a:ln w="28575">
+              <a:solidFill>
+                <a:srgbClr val="FFFF00"/>
+              </a:solidFill>
+            </a:ln>
+          </p:spPr>
+          <p:style>
+            <a:lnRef idx="2">
+              <a:schemeClr val="accent1">
+                <a:shade val="50000"/>
+              </a:schemeClr>
+            </a:lnRef>
+            <a:fillRef idx="1">
+              <a:schemeClr val="accent1"/>
+            </a:fillRef>
+            <a:effectRef idx="0">
+              <a:schemeClr val="accent1"/>
+            </a:effectRef>
+            <a:fontRef idx="minor">
+              <a:schemeClr val="lt1"/>
+            </a:fontRef>
+          </p:style>
+          <p:txBody>
+            <a:bodyPr rtlCol="0" anchor="ctr"/>
+            <a:lstStyle/>
+            <a:p>
+              <a:pPr algn="ctr"/>
+              <a:endParaRPr lang="ko-KR" altLang="en-US"/>
+            </a:p>
+          </p:txBody>
+        </p:sp>
+        <p:sp>
+          <p:nvSpPr>
+            <p:cNvPr id="26" name="직사각형 25">
+              <a:extLst>
+                <a:ext uri="{FF2B5EF4-FFF2-40B4-BE49-F238E27FC236}">
+                  <a16:creationId xmlns:a16="http://schemas.microsoft.com/office/drawing/2014/main" id="{7CA4837D-7BDB-8B5B-3902-0AD75B2AD7C2}"/>
+                </a:ext>
+              </a:extLst>
+            </p:cNvPr>
+            <p:cNvSpPr/>
+            <p:nvPr/>
+          </p:nvSpPr>
+          <p:spPr>
+            <a:xfrm>
+              <a:off x="6252678" y="5057387"/>
+              <a:ext cx="466530" cy="447869"/>
+            </a:xfrm>
+            <a:prstGeom prst="rect">
+              <a:avLst/>
+            </a:prstGeom>
+            <a:noFill/>
+            <a:ln w="28575">
+              <a:solidFill>
+                <a:srgbClr val="FFFF00"/>
+              </a:solidFill>
+            </a:ln>
+          </p:spPr>
+          <p:style>
+            <a:lnRef idx="2">
+              <a:schemeClr val="accent1">
+                <a:shade val="50000"/>
+              </a:schemeClr>
+            </a:lnRef>
+            <a:fillRef idx="1">
+              <a:schemeClr val="accent1"/>
+            </a:fillRef>
+            <a:effectRef idx="0">
+              <a:schemeClr val="accent1"/>
+            </a:effectRef>
+            <a:fontRef idx="minor">
+              <a:schemeClr val="lt1"/>
+            </a:fontRef>
+          </p:style>
+          <p:txBody>
+            <a:bodyPr rtlCol="0" anchor="ctr"/>
+            <a:lstStyle/>
+            <a:p>
+              <a:pPr algn="ctr"/>
+              <a:endParaRPr lang="ko-KR" altLang="en-US"/>
+            </a:p>
+          </p:txBody>
+        </p:sp>
+        <p:sp>
+          <p:nvSpPr>
+            <p:cNvPr id="27" name="직사각형 26">
+              <a:extLst>
+                <a:ext uri="{FF2B5EF4-FFF2-40B4-BE49-F238E27FC236}">
+                  <a16:creationId xmlns:a16="http://schemas.microsoft.com/office/drawing/2014/main" id="{B672DA06-B9F6-1B87-CA8A-6A5CEE585B5F}"/>
+                </a:ext>
+              </a:extLst>
+            </p:cNvPr>
+            <p:cNvSpPr/>
+            <p:nvPr/>
+          </p:nvSpPr>
+          <p:spPr>
+            <a:xfrm>
+              <a:off x="2495551" y="4668229"/>
+              <a:ext cx="466530" cy="447869"/>
+            </a:xfrm>
+            <a:prstGeom prst="rect">
+              <a:avLst/>
+            </a:prstGeom>
+            <a:noFill/>
+            <a:ln w="28575">
+              <a:solidFill>
+                <a:srgbClr val="FF0000"/>
+              </a:solidFill>
+            </a:ln>
+          </p:spPr>
+          <p:style>
+            <a:lnRef idx="2">
+              <a:schemeClr val="accent1">
+                <a:shade val="50000"/>
+              </a:schemeClr>
+            </a:lnRef>
+            <a:fillRef idx="1">
+              <a:schemeClr val="accent1"/>
+            </a:fillRef>
+            <a:effectRef idx="0">
+              <a:schemeClr val="accent1"/>
+            </a:effectRef>
+            <a:fontRef idx="minor">
+              <a:schemeClr val="lt1"/>
+            </a:fontRef>
+          </p:style>
+          <p:txBody>
+            <a:bodyPr rtlCol="0" anchor="ctr"/>
+            <a:lstStyle/>
+            <a:p>
+              <a:pPr algn="ctr"/>
+              <a:endParaRPr lang="ko-KR" altLang="en-US"/>
+            </a:p>
+          </p:txBody>
+        </p:sp>
+        <p:sp>
+          <p:nvSpPr>
+            <p:cNvPr id="28" name="직사각형 27">
+              <a:extLst>
+                <a:ext uri="{FF2B5EF4-FFF2-40B4-BE49-F238E27FC236}">
+                  <a16:creationId xmlns:a16="http://schemas.microsoft.com/office/drawing/2014/main" id="{8E4784AE-05A7-F90F-75D1-B8D9AC24DC02}"/>
+                </a:ext>
+              </a:extLst>
+            </p:cNvPr>
+            <p:cNvSpPr/>
+            <p:nvPr/>
+          </p:nvSpPr>
+          <p:spPr>
+            <a:xfrm>
+              <a:off x="3640106" y="3268637"/>
+              <a:ext cx="466530" cy="447869"/>
+            </a:xfrm>
+            <a:prstGeom prst="rect">
+              <a:avLst/>
+            </a:prstGeom>
+            <a:noFill/>
+            <a:ln w="28575">
+              <a:solidFill>
+                <a:srgbClr val="FFFF00"/>
+              </a:solidFill>
+            </a:ln>
+          </p:spPr>
+          <p:style>
+            <a:lnRef idx="2">
+              <a:schemeClr val="accent1">
+                <a:shade val="50000"/>
+              </a:schemeClr>
+            </a:lnRef>
+            <a:fillRef idx="1">
+              <a:schemeClr val="accent1"/>
+            </a:fillRef>
+            <a:effectRef idx="0">
+              <a:schemeClr val="accent1"/>
+            </a:effectRef>
+            <a:fontRef idx="minor">
+              <a:schemeClr val="lt1"/>
+            </a:fontRef>
+          </p:style>
+          <p:txBody>
+            <a:bodyPr rtlCol="0" anchor="ctr"/>
+            <a:lstStyle/>
+            <a:p>
+              <a:pPr algn="ctr"/>
+              <a:endParaRPr lang="ko-KR" altLang="en-US"/>
+            </a:p>
+          </p:txBody>
+        </p:sp>
+        <p:sp>
+          <p:nvSpPr>
+            <p:cNvPr id="29" name="직사각형 28">
+              <a:extLst>
+                <a:ext uri="{FF2B5EF4-FFF2-40B4-BE49-F238E27FC236}">
+                  <a16:creationId xmlns:a16="http://schemas.microsoft.com/office/drawing/2014/main" id="{F5BE5A4E-CD7F-51D2-C8F2-54D1E990E8B6}"/>
+                </a:ext>
+              </a:extLst>
+            </p:cNvPr>
+            <p:cNvSpPr/>
+            <p:nvPr/>
+          </p:nvSpPr>
+          <p:spPr>
+            <a:xfrm>
+              <a:off x="4229101" y="677837"/>
+              <a:ext cx="466530" cy="447869"/>
+            </a:xfrm>
+            <a:prstGeom prst="rect">
+              <a:avLst/>
+            </a:prstGeom>
+            <a:noFill/>
+            <a:ln w="28575">
+              <a:solidFill>
+                <a:srgbClr val="FF0000"/>
+              </a:solidFill>
+            </a:ln>
+          </p:spPr>
+          <p:style>
+            <a:lnRef idx="2">
+              <a:schemeClr val="accent1">
+                <a:shade val="50000"/>
+              </a:schemeClr>
+            </a:lnRef>
+            <a:fillRef idx="1">
+              <a:schemeClr val="accent1"/>
+            </a:fillRef>
+            <a:effectRef idx="0">
+              <a:schemeClr val="accent1"/>
+            </a:effectRef>
+            <a:fontRef idx="minor">
+              <a:schemeClr val="lt1"/>
+            </a:fontRef>
+          </p:style>
+          <p:txBody>
+            <a:bodyPr rtlCol="0" anchor="ctr"/>
+            <a:lstStyle/>
+            <a:p>
+              <a:pPr algn="ctr"/>
+              <a:endParaRPr lang="ko-KR" altLang="en-US"/>
+            </a:p>
+          </p:txBody>
+        </p:sp>
+        <p:sp>
+          <p:nvSpPr>
+            <p:cNvPr id="30" name="직사각형 29">
+              <a:extLst>
+                <a:ext uri="{FF2B5EF4-FFF2-40B4-BE49-F238E27FC236}">
+                  <a16:creationId xmlns:a16="http://schemas.microsoft.com/office/drawing/2014/main" id="{5A19E3E2-6594-9D6D-406D-3BE3152BE72D}"/>
+                </a:ext>
+              </a:extLst>
+            </p:cNvPr>
+            <p:cNvSpPr/>
+            <p:nvPr/>
+          </p:nvSpPr>
+          <p:spPr>
+            <a:xfrm>
+              <a:off x="2406716" y="1013739"/>
+              <a:ext cx="466530" cy="447869"/>
+            </a:xfrm>
+            <a:prstGeom prst="rect">
+              <a:avLst/>
+            </a:prstGeom>
+            <a:noFill/>
+            <a:ln w="28575">
+              <a:solidFill>
+                <a:srgbClr val="FF0000"/>
+              </a:solidFill>
+            </a:ln>
+          </p:spPr>
+          <p:style>
+            <a:lnRef idx="2">
+              <a:schemeClr val="accent1">
+                <a:shade val="50000"/>
+              </a:schemeClr>
+            </a:lnRef>
+            <a:fillRef idx="1">
+              <a:schemeClr val="accent1"/>
+            </a:fillRef>
+            <a:effectRef idx="0">
+              <a:schemeClr val="accent1"/>
+            </a:effectRef>
+            <a:fontRef idx="minor">
+              <a:schemeClr val="lt1"/>
+            </a:fontRef>
+          </p:style>
+          <p:txBody>
+            <a:bodyPr rtlCol="0" anchor="ctr"/>
+            <a:lstStyle/>
+            <a:p>
+              <a:pPr algn="ctr"/>
+              <a:endParaRPr lang="ko-KR" altLang="en-US"/>
+            </a:p>
+          </p:txBody>
+        </p:sp>
+        <p:sp>
+          <p:nvSpPr>
+            <p:cNvPr id="31" name="직사각형 30">
+              <a:extLst>
+                <a:ext uri="{FF2B5EF4-FFF2-40B4-BE49-F238E27FC236}">
+                  <a16:creationId xmlns:a16="http://schemas.microsoft.com/office/drawing/2014/main" id="{E44001AD-889F-D728-4630-33EB451B3EBB}"/>
+                </a:ext>
+              </a:extLst>
+            </p:cNvPr>
+            <p:cNvSpPr/>
+            <p:nvPr/>
+          </p:nvSpPr>
+          <p:spPr>
+            <a:xfrm>
+              <a:off x="2262286" y="1203455"/>
+              <a:ext cx="466530" cy="447869"/>
+            </a:xfrm>
+            <a:prstGeom prst="rect">
+              <a:avLst/>
+            </a:prstGeom>
+            <a:noFill/>
+            <a:ln w="28575">
+              <a:solidFill>
+                <a:srgbClr val="FF0000"/>
+              </a:solidFill>
+            </a:ln>
+          </p:spPr>
+          <p:style>
+            <a:lnRef idx="2">
+              <a:schemeClr val="accent1">
+                <a:shade val="50000"/>
+              </a:schemeClr>
+            </a:lnRef>
+            <a:fillRef idx="1">
+              <a:schemeClr val="accent1"/>
+            </a:fillRef>
+            <a:effectRef idx="0">
+              <a:schemeClr val="accent1"/>
+            </a:effectRef>
+            <a:fontRef idx="minor">
+              <a:schemeClr val="lt1"/>
+            </a:fontRef>
+          </p:style>
+          <p:txBody>
+            <a:bodyPr rtlCol="0" anchor="ctr"/>
+            <a:lstStyle/>
+            <a:p>
+              <a:pPr algn="ctr"/>
+              <a:endParaRPr lang="ko-KR" altLang="en-US"/>
+            </a:p>
+          </p:txBody>
+        </p:sp>
+      </p:grpSp>
+    </p:spTree>
+    <p:extLst>
+      <p:ext uri="{BB962C8B-B14F-4D97-AF65-F5344CB8AC3E}">
+        <p14:creationId xmlns:p14="http://schemas.microsoft.com/office/powerpoint/2010/main" val="3476163504"/>
+      </p:ext>
+    </p:extLst>
+  </p:cSld>
+  <p:clrMapOvr>
+    <a:masterClrMapping/>
+  </p:clrMapOvr>
+</p:sld>
+</file>
+
 <file path=ppt/theme/theme1.xml><?xml version="1.0" encoding="utf-8"?>
 <a:theme xmlns:a="http://schemas.openxmlformats.org/drawingml/2006/main" name="Office 테마">
   <a:themeElements>

</xml_diff>